<commit_message>
Added parallelisation and some more
</commit_message>
<xml_diff>
--- a/saved_pptx/output.pptx
+++ b/saved_pptx/output.pptx
@@ -3081,6 +3081,14 @@
 <file path=ppt/slides/slide1.xml><?xml version="1.0" encoding="utf-8"?>
 <p:sld xmlns:a="http://schemas.openxmlformats.org/drawingml/2006/main" xmlns:p="http://schemas.openxmlformats.org/presentationml/2006/main" xmlns:r="http://schemas.openxmlformats.org/officeDocument/2006/relationships">
   <p:cSld>
+    <p:bg>
+      <p:bgPr>
+        <a:solidFill>
+          <a:srgbClr val="FFDF00"/>
+        </a:solidFill>
+        <a:effectLst/>
+      </p:bgPr>
+    </p:bg>
     <p:spTree>
       <p:nvGrpSpPr>
         <p:cNvPr id="1" name=""/>
@@ -3102,11 +3110,7 @@
         <p:txBody>
           <a:bodyPr/>
           <a:lstStyle/>
-          <a:p>
-            <a:r>
-              <a:t>Delicious Hamburger</a:t>
-            </a:r>
-          </a:p>
+          <a:p/>
         </p:txBody>
       </p:sp>
       <p:sp>
@@ -3117,7 +3121,7 @@
         </p:nvSpPr>
         <p:spPr>
           <a:xfrm>
-            <a:off x="914400" y="1828800"/>
+            <a:off x="914400" y="914400"/>
             <a:ext cx="7315200" cy="914400"/>
           </a:xfrm>
           <a:prstGeom prst="rect">
@@ -3130,17 +3134,21 @@
             <a:spAutoFit/>
           </a:bodyPr>
           <a:lstStyle/>
-          <a:p/>
+          <a:p>
+            <a:r>
+              <a:t>Introduction to Fast Food</a:t>
+            </a:r>
+          </a:p>
           <a:p>
             <a:pPr>
-              <a:defRPr sz="3600">
+              <a:defRPr sz="5760" b="1">
                 <a:solidFill>
-                  <a:srgbClr val="000000"/>
+                  <a:srgbClr val="FF0000"/>
                 </a:solidFill>
               </a:defRPr>
             </a:pPr>
             <a:r>
-              <a:t>A hamburger is a sandwich consisting of a cooked patty of ground meat, usually beef, placed inside a sliced bun.</a:t>
+              <a:t>Pizza and Hamburgers</a:t>
             </a:r>
           </a:p>
         </p:txBody>

</xml_diff>